<commit_message>
Bi-weekly updates and Documentation template updates.
Bi-weekly: made a 2022 directory and moved all 2021 meeting folders to the 2021 directory.

Documentation Templates: Updated the Latex template of Service Description SD document. Working on the IDD, SysD, SosD, SysDD, and SosDD.
</commit_message>
<xml_diff>
--- a/Governanace_strategy/Eclipse_Arrowhead_Roadmap_organisation.pptx
+++ b/Governanace_strategy/Eclipse_Arrowhead_Roadmap_organisation.pptx
@@ -86,7 +86,7 @@
         <a:latin typeface="+mj-lt"/>
         <a:ea typeface="+mj-ea"/>
         <a:cs typeface="+mj-cs"/>
-        <a:sym typeface="Helvetica"/>
+        <a:sym typeface="Avenir Roman"/>
       </a:defRPr>
     </a:lvl1pPr>
     <a:lvl2pPr marL="0" marR="0" indent="0" algn="l" defTabSz="457200" rtl="0" fontAlgn="auto" latinLnBrk="0" hangingPunct="0">
@@ -116,7 +116,7 @@
         <a:latin typeface="+mj-lt"/>
         <a:ea typeface="+mj-ea"/>
         <a:cs typeface="+mj-cs"/>
-        <a:sym typeface="Helvetica"/>
+        <a:sym typeface="Avenir Roman"/>
       </a:defRPr>
     </a:lvl2pPr>
     <a:lvl3pPr marL="0" marR="0" indent="0" algn="l" defTabSz="457200" rtl="0" fontAlgn="auto" latinLnBrk="0" hangingPunct="0">
@@ -146,7 +146,7 @@
         <a:latin typeface="+mj-lt"/>
         <a:ea typeface="+mj-ea"/>
         <a:cs typeface="+mj-cs"/>
-        <a:sym typeface="Helvetica"/>
+        <a:sym typeface="Avenir Roman"/>
       </a:defRPr>
     </a:lvl3pPr>
     <a:lvl4pPr marL="0" marR="0" indent="0" algn="l" defTabSz="457200" rtl="0" fontAlgn="auto" latinLnBrk="0" hangingPunct="0">
@@ -176,7 +176,7 @@
         <a:latin typeface="+mj-lt"/>
         <a:ea typeface="+mj-ea"/>
         <a:cs typeface="+mj-cs"/>
-        <a:sym typeface="Helvetica"/>
+        <a:sym typeface="Avenir Roman"/>
       </a:defRPr>
     </a:lvl4pPr>
     <a:lvl5pPr marL="0" marR="0" indent="0" algn="l" defTabSz="457200" rtl="0" fontAlgn="auto" latinLnBrk="0" hangingPunct="0">
@@ -206,7 +206,7 @@
         <a:latin typeface="+mj-lt"/>
         <a:ea typeface="+mj-ea"/>
         <a:cs typeface="+mj-cs"/>
-        <a:sym typeface="Helvetica"/>
+        <a:sym typeface="Avenir Roman"/>
       </a:defRPr>
     </a:lvl5pPr>
     <a:lvl6pPr marL="0" marR="0" indent="0" algn="l" defTabSz="457200" rtl="0" fontAlgn="auto" latinLnBrk="0" hangingPunct="0">
@@ -236,7 +236,7 @@
         <a:latin typeface="+mj-lt"/>
         <a:ea typeface="+mj-ea"/>
         <a:cs typeface="+mj-cs"/>
-        <a:sym typeface="Helvetica"/>
+        <a:sym typeface="Avenir Roman"/>
       </a:defRPr>
     </a:lvl6pPr>
     <a:lvl7pPr marL="0" marR="0" indent="0" algn="l" defTabSz="457200" rtl="0" fontAlgn="auto" latinLnBrk="0" hangingPunct="0">
@@ -266,7 +266,7 @@
         <a:latin typeface="+mj-lt"/>
         <a:ea typeface="+mj-ea"/>
         <a:cs typeface="+mj-cs"/>
-        <a:sym typeface="Helvetica"/>
+        <a:sym typeface="Avenir Roman"/>
       </a:defRPr>
     </a:lvl7pPr>
     <a:lvl8pPr marL="0" marR="0" indent="0" algn="l" defTabSz="457200" rtl="0" fontAlgn="auto" latinLnBrk="0" hangingPunct="0">
@@ -296,7 +296,7 @@
         <a:latin typeface="+mj-lt"/>
         <a:ea typeface="+mj-ea"/>
         <a:cs typeface="+mj-cs"/>
-        <a:sym typeface="Helvetica"/>
+        <a:sym typeface="Avenir Roman"/>
       </a:defRPr>
     </a:lvl8pPr>
     <a:lvl9pPr marL="0" marR="0" indent="0" algn="l" defTabSz="457200" rtl="0" fontAlgn="auto" latinLnBrk="0" hangingPunct="0">
@@ -326,7 +326,7 @@
         <a:latin typeface="+mj-lt"/>
         <a:ea typeface="+mj-ea"/>
         <a:cs typeface="+mj-cs"/>
-        <a:sym typeface="Helvetica"/>
+        <a:sym typeface="Avenir Roman"/>
       </a:defRPr>
     </a:lvl9pPr>
   </p:defaultTextStyle>
@@ -413,9 +413,9 @@
         <a:spcPct val="125000"/>
       </a:lnSpc>
       <a:defRPr sz="2400">
-        <a:latin typeface="+mn-lt"/>
-        <a:ea typeface="+mn-ea"/>
-        <a:cs typeface="+mn-cs"/>
+        <a:latin typeface="+mj-lt"/>
+        <a:ea typeface="+mj-ea"/>
+        <a:cs typeface="+mj-cs"/>
         <a:sym typeface="Avenir Roman"/>
       </a:defRPr>
     </a:lvl1pPr>
@@ -424,9 +424,9 @@
         <a:spcPct val="125000"/>
       </a:lnSpc>
       <a:defRPr sz="2400">
-        <a:latin typeface="+mn-lt"/>
-        <a:ea typeface="+mn-ea"/>
-        <a:cs typeface="+mn-cs"/>
+        <a:latin typeface="+mj-lt"/>
+        <a:ea typeface="+mj-ea"/>
+        <a:cs typeface="+mj-cs"/>
         <a:sym typeface="Avenir Roman"/>
       </a:defRPr>
     </a:lvl2pPr>
@@ -435,9 +435,9 @@
         <a:spcPct val="125000"/>
       </a:lnSpc>
       <a:defRPr sz="2400">
-        <a:latin typeface="+mn-lt"/>
-        <a:ea typeface="+mn-ea"/>
-        <a:cs typeface="+mn-cs"/>
+        <a:latin typeface="+mj-lt"/>
+        <a:ea typeface="+mj-ea"/>
+        <a:cs typeface="+mj-cs"/>
         <a:sym typeface="Avenir Roman"/>
       </a:defRPr>
     </a:lvl3pPr>
@@ -446,9 +446,9 @@
         <a:spcPct val="125000"/>
       </a:lnSpc>
       <a:defRPr sz="2400">
-        <a:latin typeface="+mn-lt"/>
-        <a:ea typeface="+mn-ea"/>
-        <a:cs typeface="+mn-cs"/>
+        <a:latin typeface="+mj-lt"/>
+        <a:ea typeface="+mj-ea"/>
+        <a:cs typeface="+mj-cs"/>
         <a:sym typeface="Avenir Roman"/>
       </a:defRPr>
     </a:lvl4pPr>
@@ -457,9 +457,9 @@
         <a:spcPct val="125000"/>
       </a:lnSpc>
       <a:defRPr sz="2400">
-        <a:latin typeface="+mn-lt"/>
-        <a:ea typeface="+mn-ea"/>
-        <a:cs typeface="+mn-cs"/>
+        <a:latin typeface="+mj-lt"/>
+        <a:ea typeface="+mj-ea"/>
+        <a:cs typeface="+mj-cs"/>
         <a:sym typeface="Avenir Roman"/>
       </a:defRPr>
     </a:lvl5pPr>
@@ -468,9 +468,9 @@
         <a:spcPct val="125000"/>
       </a:lnSpc>
       <a:defRPr sz="2400">
-        <a:latin typeface="+mn-lt"/>
-        <a:ea typeface="+mn-ea"/>
-        <a:cs typeface="+mn-cs"/>
+        <a:latin typeface="+mj-lt"/>
+        <a:ea typeface="+mj-ea"/>
+        <a:cs typeface="+mj-cs"/>
         <a:sym typeface="Avenir Roman"/>
       </a:defRPr>
     </a:lvl6pPr>
@@ -479,9 +479,9 @@
         <a:spcPct val="125000"/>
       </a:lnSpc>
       <a:defRPr sz="2400">
-        <a:latin typeface="+mn-lt"/>
-        <a:ea typeface="+mn-ea"/>
-        <a:cs typeface="+mn-cs"/>
+        <a:latin typeface="+mj-lt"/>
+        <a:ea typeface="+mj-ea"/>
+        <a:cs typeface="+mj-cs"/>
         <a:sym typeface="Avenir Roman"/>
       </a:defRPr>
     </a:lvl7pPr>
@@ -490,9 +490,9 @@
         <a:spcPct val="125000"/>
       </a:lnSpc>
       <a:defRPr sz="2400">
-        <a:latin typeface="+mn-lt"/>
-        <a:ea typeface="+mn-ea"/>
-        <a:cs typeface="+mn-cs"/>
+        <a:latin typeface="+mj-lt"/>
+        <a:ea typeface="+mj-ea"/>
+        <a:cs typeface="+mj-cs"/>
         <a:sym typeface="Avenir Roman"/>
       </a:defRPr>
     </a:lvl8pPr>
@@ -501,9 +501,9 @@
         <a:spcPct val="125000"/>
       </a:lnSpc>
       <a:defRPr sz="2400">
-        <a:latin typeface="+mn-lt"/>
-        <a:ea typeface="+mn-ea"/>
-        <a:cs typeface="+mn-cs"/>
+        <a:latin typeface="+mj-lt"/>
+        <a:ea typeface="+mj-ea"/>
+        <a:cs typeface="+mj-cs"/>
         <a:sym typeface="Avenir Roman"/>
       </a:defRPr>
     </a:lvl9pPr>
@@ -656,8 +656,8 @@
         </p:nvSpPr>
         <p:spPr>
           <a:xfrm>
-            <a:off x="374547" y="5168258"/>
-            <a:ext cx="3966631" cy="196013"/>
+            <a:off x="374546" y="5168258"/>
+            <a:ext cx="3966633" cy="196013"/>
           </a:xfrm>
           <a:prstGeom prst="rect">
             <a:avLst/>
@@ -712,7 +712,7 @@
         <p:spPr>
           <a:xfrm>
             <a:off x="7825740" y="4516958"/>
-            <a:ext cx="1005842" cy="987494"/>
+            <a:ext cx="1005843" cy="987494"/>
           </a:xfrm>
           <a:prstGeom prst="rect">
             <a:avLst/>
@@ -871,8 +871,8 @@
         </p:blipFill>
         <p:spPr>
           <a:xfrm>
-            <a:off x="-397" y="-7871"/>
-            <a:ext cx="9144793" cy="5730740"/>
+            <a:off x="-397" y="-7872"/>
+            <a:ext cx="9144793" cy="5730742"/>
           </a:xfrm>
           <a:prstGeom prst="rect">
             <a:avLst/>
@@ -890,8 +890,8 @@
         </p:nvSpPr>
         <p:spPr>
           <a:xfrm>
-            <a:off x="374547" y="5168258"/>
-            <a:ext cx="3966631" cy="196013"/>
+            <a:off x="374546" y="5168258"/>
+            <a:ext cx="3966633" cy="196013"/>
           </a:xfrm>
           <a:prstGeom prst="rect">
             <a:avLst/>
@@ -941,7 +941,7 @@
         <p:spPr>
           <a:xfrm>
             <a:off x="799889" y="916071"/>
-            <a:ext cx="7444938" cy="586588"/>
+            <a:ext cx="7444938" cy="586589"/>
           </a:xfrm>
           <a:prstGeom prst="rect">
             <a:avLst/>
@@ -1135,8 +1135,8 @@
         </p:blipFill>
         <p:spPr>
           <a:xfrm>
-            <a:off x="-397" y="-7871"/>
-            <a:ext cx="9144793" cy="5730740"/>
+            <a:off x="-397" y="-7872"/>
+            <a:ext cx="9144793" cy="5730742"/>
           </a:xfrm>
           <a:prstGeom prst="rect">
             <a:avLst/>
@@ -1154,8 +1154,8 @@
         </p:nvSpPr>
         <p:spPr>
           <a:xfrm>
-            <a:off x="374547" y="5168258"/>
-            <a:ext cx="3966631" cy="196013"/>
+            <a:off x="374546" y="5168258"/>
+            <a:ext cx="3966633" cy="196013"/>
           </a:xfrm>
           <a:prstGeom prst="rect">
             <a:avLst/>
@@ -1205,7 +1205,7 @@
         <p:spPr>
           <a:xfrm>
             <a:off x="799889" y="916071"/>
-            <a:ext cx="7444938" cy="586588"/>
+            <a:ext cx="7444938" cy="586589"/>
           </a:xfrm>
           <a:prstGeom prst="rect">
             <a:avLst/>
@@ -1392,8 +1392,8 @@
         </p:blipFill>
         <p:spPr>
           <a:xfrm>
-            <a:off x="-6495" y="-10919"/>
-            <a:ext cx="9156990" cy="5736837"/>
+            <a:off x="-6496" y="-10920"/>
+            <a:ext cx="9156991" cy="5736839"/>
           </a:xfrm>
           <a:prstGeom prst="rect">
             <a:avLst/>
@@ -1411,8 +1411,8 @@
         </p:nvSpPr>
         <p:spPr>
           <a:xfrm>
-            <a:off x="374547" y="5168258"/>
-            <a:ext cx="3966631" cy="196013"/>
+            <a:off x="374546" y="5168258"/>
+            <a:ext cx="3966633" cy="196013"/>
           </a:xfrm>
           <a:prstGeom prst="rect">
             <a:avLst/>
@@ -1459,7 +1459,7 @@
         <p:spPr>
           <a:xfrm>
             <a:off x="799889" y="916071"/>
-            <a:ext cx="7444938" cy="586588"/>
+            <a:ext cx="7444938" cy="586589"/>
           </a:xfrm>
           <a:prstGeom prst="rect">
             <a:avLst/>
@@ -1594,8 +1594,8 @@
         </p:blipFill>
         <p:spPr>
           <a:xfrm>
-            <a:off x="-6495" y="-10919"/>
-            <a:ext cx="9156990" cy="5736837"/>
+            <a:off x="-6496" y="-10920"/>
+            <a:ext cx="9156991" cy="5736839"/>
           </a:xfrm>
           <a:prstGeom prst="rect">
             <a:avLst/>
@@ -1616,7 +1616,7 @@
         <p:spPr>
           <a:xfrm>
             <a:off x="799889" y="916071"/>
-            <a:ext cx="7444938" cy="586589"/>
+            <a:ext cx="7444938" cy="586590"/>
           </a:xfrm>
           <a:prstGeom prst="rect">
             <a:avLst/>
@@ -1654,7 +1654,6 @@
           <a:bodyPr/>
           <a:lstStyle>
             <a:lvl1pPr marL="1587" indent="-1587"/>
-            <a:lvl4pPr marL="1698169" indent="-326569"/>
           </a:lstStyle>
           <a:p>
             <a:pPr/>
@@ -1758,7 +1757,7 @@
         <p:spPr>
           <a:xfrm>
             <a:off x="1333500" y="1775354"/>
-            <a:ext cx="6477000" cy="1225024"/>
+            <a:ext cx="6477000" cy="1225025"/>
           </a:xfrm>
           <a:prstGeom prst="rect">
             <a:avLst/>
@@ -1913,7 +1912,7 @@
         <p:spPr>
           <a:xfrm>
             <a:off x="7826399" y="4517999"/>
-            <a:ext cx="1004729" cy="986402"/>
+            <a:ext cx="1004730" cy="986403"/>
           </a:xfrm>
           <a:prstGeom prst="rect">
             <a:avLst/>
@@ -1934,7 +1933,7 @@
         <p:spPr>
           <a:xfrm>
             <a:off x="7783364" y="5342459"/>
-            <a:ext cx="217637" cy="213271"/>
+            <a:ext cx="217637" cy="213272"/>
           </a:xfrm>
           <a:prstGeom prst="rect">
             <a:avLst/>
@@ -1988,7 +1987,7 @@
         <p:spPr>
           <a:xfrm>
             <a:off x="1333500" y="1775354"/>
-            <a:ext cx="6477000" cy="1225024"/>
+            <a:ext cx="6477000" cy="1225025"/>
           </a:xfrm>
           <a:prstGeom prst="rect">
             <a:avLst/>
@@ -2137,7 +2136,7 @@
         <p:spPr>
           <a:xfrm>
             <a:off x="7825740" y="4516958"/>
-            <a:ext cx="1005842" cy="987494"/>
+            <a:ext cx="1005843" cy="987494"/>
           </a:xfrm>
           <a:prstGeom prst="rect">
             <a:avLst/>
@@ -2158,7 +2157,7 @@
         <p:spPr>
           <a:xfrm>
             <a:off x="7783364" y="5342459"/>
-            <a:ext cx="217637" cy="213271"/>
+            <a:ext cx="217637" cy="213272"/>
           </a:xfrm>
           <a:prstGeom prst="rect">
             <a:avLst/>
@@ -2216,8 +2215,8 @@
         </p:nvSpPr>
         <p:spPr>
           <a:xfrm>
-            <a:off x="374547" y="5168258"/>
-            <a:ext cx="3966631" cy="196013"/>
+            <a:off x="374546" y="5168258"/>
+            <a:ext cx="3966633" cy="196013"/>
           </a:xfrm>
           <a:prstGeom prst="rect">
             <a:avLst/>
@@ -2272,7 +2271,7 @@
         <p:spPr>
           <a:xfrm>
             <a:off x="7825740" y="4516958"/>
-            <a:ext cx="1005842" cy="987494"/>
+            <a:ext cx="1005843" cy="987494"/>
           </a:xfrm>
           <a:prstGeom prst="rect">
             <a:avLst/>
@@ -2393,7 +2392,7 @@
         <p:spPr>
           <a:xfrm>
             <a:off x="8708976" y="197587"/>
-            <a:ext cx="232873" cy="228507"/>
+            <a:ext cx="232874" cy="228507"/>
           </a:xfrm>
           <a:prstGeom prst="rect">
             <a:avLst/>
@@ -3178,6 +3177,10 @@
           </p:nvPr>
         </p:nvSpPr>
         <p:spPr>
+          <a:xfrm>
+            <a:off x="1333500" y="1775354"/>
+            <a:ext cx="6477000" cy="1225025"/>
+          </a:xfrm>
           <a:prstGeom prst="rect">
             <a:avLst/>
           </a:prstGeom>
@@ -3253,6 +3256,10 @@
           </p:nvPr>
         </p:nvSpPr>
         <p:spPr>
+          <a:xfrm>
+            <a:off x="799889" y="598564"/>
+            <a:ext cx="7444938" cy="586590"/>
+          </a:xfrm>
           <a:prstGeom prst="rect">
             <a:avLst/>
           </a:prstGeom>
@@ -3261,8 +3268,8 @@
           <a:bodyPr/>
           <a:lstStyle/>
           <a:p>
-            <a:pPr defTabSz="320039">
-              <a:defRPr sz="2520"/>
+            <a:pPr defTabSz="320038">
+              <a:defRPr sz="2500"/>
             </a:pPr>
             <a:r>
               <a:t>Eclipse Arrowhead communication strategy- </a:t>
@@ -3287,6 +3294,10 @@
           </p:nvPr>
         </p:nvSpPr>
         <p:spPr>
+          <a:xfrm>
+            <a:off x="799889" y="1185150"/>
+            <a:ext cx="7444938" cy="4529852"/>
+          </a:xfrm>
           <a:prstGeom prst="rect">
             <a:avLst/>
           </a:prstGeom>
@@ -3304,7 +3315,7 @@
             </a:r>
           </a:p>
           <a:p>
-            <a:pPr lvl="1" marL="775368" indent="-267368">
+            <a:pPr lvl="1" marL="775367" indent="-267367">
               <a:buAutoNum type="arabicPeriod" startAt="1"/>
             </a:pPr>
             <a:r>
@@ -3312,7 +3323,7 @@
             </a:r>
           </a:p>
           <a:p>
-            <a:pPr lvl="1" marL="775368" indent="-267368">
+            <a:pPr lvl="1" marL="775367" indent="-267367">
               <a:buAutoNum type="arabicPeriod" startAt="1"/>
             </a:pPr>
             <a:r>
@@ -3320,7 +3331,7 @@
             </a:r>
           </a:p>
           <a:p>
-            <a:pPr lvl="1" marL="775368" indent="-267368">
+            <a:pPr lvl="1" marL="775367" indent="-267367">
               <a:buAutoNum type="arabicPeriod" startAt="1"/>
             </a:pPr>
             <a:r>
@@ -3328,7 +3339,7 @@
             </a:r>
           </a:p>
           <a:p>
-            <a:pPr lvl="1" marL="775368" indent="-267368">
+            <a:pPr lvl="1" marL="775367" indent="-267367">
               <a:buAutoNum type="arabicPeriod" startAt="1"/>
             </a:pPr>
             <a:r>
@@ -3336,7 +3347,7 @@
             </a:r>
           </a:p>
           <a:p>
-            <a:pPr lvl="1" marL="775368" indent="-267368">
+            <a:pPr lvl="1" marL="775367" indent="-267367">
               <a:buAutoNum type="arabicPeriod" startAt="1"/>
             </a:pPr>
             <a:r>
@@ -3344,7 +3355,7 @@
             </a:r>
           </a:p>
           <a:p>
-            <a:pPr lvl="1" marL="775368" indent="-267368">
+            <a:pPr lvl="1" marL="775367" indent="-267367">
               <a:buAutoNum type="arabicPeriod" startAt="1"/>
             </a:pPr>
             <a:r>
@@ -3352,7 +3363,7 @@
             </a:r>
           </a:p>
           <a:p>
-            <a:pPr lvl="1" marL="775368" indent="-267368">
+            <a:pPr lvl="1" marL="775367" indent="-267367">
               <a:buAutoNum type="arabicPeriod" startAt="1"/>
             </a:pPr>
           </a:p>
@@ -3412,7 +3423,7 @@
         <p:spPr>
           <a:xfrm>
             <a:off x="799889" y="182946"/>
-            <a:ext cx="7444938" cy="586589"/>
+            <a:ext cx="7444938" cy="586590"/>
           </a:xfrm>
           <a:prstGeom prst="rect">
             <a:avLst/>
@@ -3439,8 +3450,8 @@
         </p:nvSpPr>
         <p:spPr>
           <a:xfrm>
-            <a:off x="799889" y="803291"/>
-            <a:ext cx="7444938" cy="4639973"/>
+            <a:off x="799889" y="803290"/>
+            <a:ext cx="7444938" cy="4639974"/>
           </a:xfrm>
           <a:prstGeom prst="rect">
             <a:avLst/>
@@ -3450,48 +3461,48 @@
           <a:bodyPr/>
           <a:lstStyle/>
           <a:p>
-            <a:pPr marL="150241" indent="-150241" defTabSz="256031">
+            <a:pPr marL="150240" indent="-150240" defTabSz="256031">
               <a:spcBef>
                 <a:spcPts val="200"/>
               </a:spcBef>
-              <a:defRPr sz="1120"/>
+              <a:defRPr sz="1100"/>
             </a:pPr>
             <a:r>
               <a:t>Targeting developers of </a:t>
             </a:r>
           </a:p>
           <a:p>
-            <a:pPr lvl="1" marL="150241" indent="0" defTabSz="256031">
+            <a:pPr lvl="1" marL="0" indent="150240" defTabSz="256031">
               <a:spcBef>
                 <a:spcPts val="200"/>
               </a:spcBef>
               <a:buSzTx/>
               <a:buNone/>
-              <a:defRPr sz="1120"/>
+              <a:defRPr sz="1100"/>
             </a:pPr>
             <a:r>
               <a:t>core systems </a:t>
             </a:r>
           </a:p>
           <a:p>
-            <a:pPr lvl="1" marL="150241" indent="0" defTabSz="256031">
+            <a:pPr lvl="1" marL="0" indent="150240" defTabSz="256031">
               <a:spcBef>
                 <a:spcPts val="200"/>
               </a:spcBef>
               <a:buSzTx/>
               <a:buNone/>
-              <a:defRPr sz="1120"/>
+              <a:defRPr sz="1100"/>
             </a:pPr>
             <a:r>
               <a:t>application systems</a:t>
             </a:r>
           </a:p>
           <a:p>
-            <a:pPr marL="150241" indent="-150241" defTabSz="256031">
+            <a:pPr marL="150240" indent="-150240" defTabSz="256031">
               <a:spcBef>
                 <a:spcPts val="200"/>
               </a:spcBef>
-              <a:defRPr sz="1120"/>
+              <a:defRPr sz="1100"/>
             </a:pPr>
             <a:r>
               <a:t>Primary location </a:t>
@@ -3512,36 +3523,36 @@
             </a:r>
           </a:p>
           <a:p>
-            <a:pPr lvl="1" marL="150241" indent="0" defTabSz="256031">
+            <a:pPr lvl="1" marL="0" indent="150240" defTabSz="256031">
               <a:spcBef>
                 <a:spcPts val="200"/>
               </a:spcBef>
               <a:buSzTx/>
               <a:buNone/>
-              <a:defRPr sz="1120"/>
+              <a:defRPr sz="1100"/>
             </a:pPr>
             <a:r>
               <a:t>For core system implementations e.g. java, c++</a:t>
             </a:r>
           </a:p>
           <a:p>
-            <a:pPr lvl="1" marL="150241" indent="0" defTabSz="256031">
+            <a:pPr lvl="1" marL="0" indent="150240" defTabSz="256031">
               <a:spcBef>
                 <a:spcPts val="200"/>
               </a:spcBef>
               <a:buSzTx/>
               <a:buNone/>
-              <a:defRPr sz="1120"/>
-            </a:pPr>
-          </a:p>
-          <a:p>
-            <a:pPr lvl="1" marL="150241" indent="0" defTabSz="256031">
+              <a:defRPr sz="1100"/>
+            </a:pPr>
+          </a:p>
+          <a:p>
+            <a:pPr lvl="1" marL="0" indent="150240" defTabSz="256031">
               <a:spcBef>
                 <a:spcPts val="200"/>
               </a:spcBef>
               <a:buSzTx/>
               <a:buNone/>
-              <a:defRPr sz="1120"/>
+              <a:defRPr sz="1100"/>
             </a:pPr>
             <a:r>
               <a:t>Core system documentation in each core system directory - </a:t>
@@ -3556,78 +3567,78 @@
             </a:r>
           </a:p>
           <a:p>
-            <a:pPr lvl="1" marL="150241" indent="0" defTabSz="256031">
+            <a:pPr lvl="1" marL="0" indent="150240" defTabSz="256031">
               <a:spcBef>
                 <a:spcPts val="200"/>
               </a:spcBef>
               <a:buSzTx/>
               <a:buNone/>
-              <a:defRPr sz="1120"/>
+              <a:defRPr sz="1100"/>
             </a:pPr>
             <a:r>
               <a:t>Interoperability adaptors</a:t>
             </a:r>
           </a:p>
           <a:p>
-            <a:pPr lvl="1" marL="150241" indent="0" defTabSz="256031">
+            <a:pPr lvl="1" marL="0" indent="150240" defTabSz="256031">
               <a:spcBef>
                 <a:spcPts val="200"/>
               </a:spcBef>
               <a:buSzTx/>
               <a:buNone/>
-              <a:defRPr sz="1120"/>
+              <a:defRPr sz="1100"/>
             </a:pPr>
             <a:r>
               <a:t>Tool adaptors</a:t>
             </a:r>
           </a:p>
           <a:p>
-            <a:pPr lvl="1" marL="150241" indent="0" defTabSz="256031">
+            <a:pPr lvl="1" marL="0" indent="150240" defTabSz="256031">
               <a:spcBef>
                 <a:spcPts val="200"/>
               </a:spcBef>
               <a:buSzTx/>
               <a:buNone/>
-              <a:defRPr sz="1120"/>
+              <a:defRPr sz="1100"/>
             </a:pPr>
             <a:r>
               <a:t>Libraries</a:t>
             </a:r>
           </a:p>
           <a:p>
-            <a:pPr lvl="1" marL="150241" indent="0" defTabSz="256031">
+            <a:pPr lvl="1" marL="0" indent="150240" defTabSz="256031">
               <a:spcBef>
                 <a:spcPts val="200"/>
               </a:spcBef>
               <a:buSzTx/>
               <a:buNone/>
-              <a:defRPr sz="1120"/>
+              <a:defRPr sz="1100"/>
             </a:pPr>
             <a:r>
               <a:t>Application system examples</a:t>
             </a:r>
           </a:p>
           <a:p>
-            <a:pPr lvl="2" marL="150241" indent="521842" defTabSz="256031">
+            <a:pPr lvl="2" marL="0" indent="672083" defTabSz="256031">
               <a:spcBef>
                 <a:spcPts val="200"/>
               </a:spcBef>
               <a:buSzTx/>
               <a:buNone/>
-              <a:defRPr sz="1120"/>
+              <a:defRPr sz="1100"/>
             </a:pPr>
             <a:r>
               <a:t>sub directory Documentation</a:t>
             </a:r>
           </a:p>
           <a:p>
-            <a:pPr lvl="2" marL="150241" indent="521842" defTabSz="256031">
+            <a:pPr lvl="2" marL="0" indent="672083" defTabSz="256031">
               <a:spcBef>
                 <a:spcPts val="200"/>
               </a:spcBef>
               <a:buSzTx/>
               <a:buNone/>
-              <a:defRPr sz="1120"/>
+              <a:defRPr sz="1100"/>
             </a:pPr>
             <a:r>
               <a:t>Arrowhead documentation structure</a:t>
@@ -3635,117 +3646,117 @@
             <a:br/>
           </a:p>
           <a:p>
-            <a:pPr lvl="1" marL="150241" indent="0" defTabSz="256031">
+            <a:pPr lvl="1" marL="0" indent="150240" defTabSz="256031">
               <a:spcBef>
                 <a:spcPts val="200"/>
               </a:spcBef>
               <a:buSzTx/>
               <a:buNone/>
-              <a:defRPr sz="1120"/>
+              <a:defRPr sz="1100"/>
             </a:pPr>
             <a:r>
               <a:t>Wiki addressing </a:t>
             </a:r>
           </a:p>
           <a:p>
-            <a:pPr lvl="2" marL="150241" indent="521842" defTabSz="256031">
+            <a:pPr lvl="2" marL="0" indent="672083" defTabSz="256031">
               <a:spcBef>
                 <a:spcPts val="200"/>
               </a:spcBef>
               <a:buSzTx/>
               <a:buNone/>
-              <a:defRPr sz="1120"/>
+              <a:defRPr sz="1100"/>
             </a:pPr>
             <a:r>
               <a:t>application system development - direct coding</a:t>
             </a:r>
           </a:p>
           <a:p>
-            <a:pPr lvl="2" marL="150241" indent="521842" defTabSz="256031">
+            <a:pPr lvl="2" marL="0" indent="672083" defTabSz="256031">
               <a:spcBef>
                 <a:spcPts val="200"/>
               </a:spcBef>
               <a:buSzTx/>
               <a:buNone/>
-              <a:defRPr sz="1120"/>
+              <a:defRPr sz="1100"/>
             </a:pPr>
             <a:r>
               <a:t>application system development - from models (SysML)</a:t>
             </a:r>
           </a:p>
           <a:p>
-            <a:pPr lvl="2" marL="150241" indent="521842" defTabSz="256031">
+            <a:pPr lvl="2" marL="0" indent="672083" defTabSz="256031">
               <a:spcBef>
                 <a:spcPts val="200"/>
               </a:spcBef>
               <a:buSzTx/>
               <a:buNone/>
-              <a:defRPr sz="1120"/>
+              <a:defRPr sz="1100"/>
             </a:pPr>
             <a:r>
               <a:t>application system examples using important libraries e.g.</a:t>
             </a:r>
           </a:p>
           <a:p>
-            <a:pPr lvl="3" marL="150241" indent="800733" defTabSz="256031">
+            <a:pPr lvl="3" marL="0" indent="950974" defTabSz="256031">
               <a:spcBef>
                 <a:spcPts val="200"/>
               </a:spcBef>
               <a:buSzTx/>
               <a:buNone/>
-              <a:defRPr sz="1120"/>
+              <a:defRPr sz="1100"/>
             </a:pPr>
             <a:r>
               <a:t>Kalix</a:t>
             </a:r>
           </a:p>
           <a:p>
-            <a:pPr lvl="3" marL="150241" indent="800733" defTabSz="256031">
+            <a:pPr lvl="3" marL="0" indent="950974" defTabSz="256031">
               <a:spcBef>
                 <a:spcPts val="200"/>
               </a:spcBef>
               <a:buSzTx/>
               <a:buNone/>
-              <a:defRPr sz="1120"/>
+              <a:defRPr sz="1100"/>
             </a:pPr>
             <a:r>
               <a:t>C++</a:t>
             </a:r>
           </a:p>
           <a:p>
-            <a:pPr lvl="3" marL="150241" indent="800733" defTabSz="256031">
+            <a:pPr lvl="3" marL="0" indent="950974" defTabSz="256031">
               <a:spcBef>
                 <a:spcPts val="200"/>
               </a:spcBef>
               <a:buSzTx/>
               <a:buNone/>
-              <a:defRPr sz="1120"/>
+              <a:defRPr sz="1100"/>
             </a:pPr>
             <a:r>
               <a:t>QT</a:t>
             </a:r>
           </a:p>
           <a:p>
-            <a:pPr lvl="1" marL="150241" indent="0" defTabSz="256031">
+            <a:pPr lvl="1" marL="0" indent="150240" defTabSz="256031">
               <a:spcBef>
                 <a:spcPts val="200"/>
               </a:spcBef>
               <a:buSzTx/>
               <a:buNone/>
-              <a:defRPr sz="1120"/>
+              <a:defRPr sz="1100"/>
             </a:pPr>
             <a:r>
               <a:t>Videos</a:t>
             </a:r>
           </a:p>
           <a:p>
-            <a:pPr lvl="2" marL="150241" indent="521842" defTabSz="256031">
+            <a:pPr lvl="2" marL="0" indent="672083" defTabSz="256031">
               <a:spcBef>
                 <a:spcPts val="200"/>
               </a:spcBef>
               <a:buSzTx/>
               <a:buNone/>
-              <a:defRPr sz="1120"/>
+              <a:defRPr sz="1100"/>
             </a:pPr>
             <a:r>
               <a:t>HowTo’s</a:t>
@@ -3788,6 +3799,10 @@
           </p:nvPr>
         </p:nvSpPr>
         <p:spPr>
+          <a:xfrm>
+            <a:off x="799889" y="598564"/>
+            <a:ext cx="7444938" cy="586590"/>
+          </a:xfrm>
           <a:prstGeom prst="rect">
             <a:avLst/>
           </a:prstGeom>
@@ -3828,46 +3843,46 @@
               <a:spcBef>
                 <a:spcPts val="200"/>
               </a:spcBef>
-              <a:defRPr sz="1260"/>
+              <a:defRPr sz="1200"/>
             </a:pPr>
             <a:r>
               <a:t>Targeting</a:t>
             </a:r>
           </a:p>
           <a:p>
-            <a:pPr lvl="1" marL="169021" indent="119014" defTabSz="288036">
+            <a:pPr lvl="1" marL="0" indent="288035" defTabSz="288036">
               <a:spcBef>
                 <a:spcPts val="200"/>
               </a:spcBef>
               <a:buSzTx/>
               <a:buNone/>
-              <a:defRPr sz="1260"/>
+              <a:defRPr sz="1200"/>
             </a:pPr>
             <a:r>
               <a:t>Automation architects</a:t>
             </a:r>
           </a:p>
           <a:p>
-            <a:pPr lvl="1" marL="169021" indent="119014" defTabSz="288036">
+            <a:pPr lvl="1" marL="0" indent="288035" defTabSz="288036">
               <a:spcBef>
                 <a:spcPts val="200"/>
               </a:spcBef>
               <a:buSzTx/>
               <a:buNone/>
-              <a:defRPr sz="1260"/>
+              <a:defRPr sz="1200"/>
             </a:pPr>
             <a:r>
               <a:t>Automation solution engineers</a:t>
             </a:r>
           </a:p>
           <a:p>
-            <a:pPr lvl="1" marL="169021" indent="119014" defTabSz="288036">
+            <a:pPr lvl="1" marL="0" indent="288035" defTabSz="288036">
               <a:spcBef>
                 <a:spcPts val="200"/>
               </a:spcBef>
               <a:buSzTx/>
               <a:buNone/>
-              <a:defRPr sz="1260"/>
+              <a:defRPr sz="1200"/>
             </a:pPr>
           </a:p>
           <a:p>
@@ -3875,7 +3890,7 @@
               <a:spcBef>
                 <a:spcPts val="200"/>
               </a:spcBef>
-              <a:defRPr sz="1260"/>
+              <a:defRPr sz="1200"/>
             </a:pPr>
             <a:r>
               <a:t>Primary location </a:t>
@@ -3896,65 +3911,65 @@
             </a:r>
           </a:p>
           <a:p>
-            <a:pPr lvl="1" marL="169021" indent="0" defTabSz="288036">
+            <a:pPr lvl="1" marL="0" indent="169021" defTabSz="288036">
               <a:spcBef>
                 <a:spcPts val="200"/>
               </a:spcBef>
               <a:buSzTx/>
               <a:buNone/>
-              <a:defRPr sz="1260"/>
+              <a:defRPr sz="1200"/>
             </a:pPr>
             <a:r>
               <a:t>Core system documentation in each core system directory</a:t>
             </a:r>
           </a:p>
           <a:p>
-            <a:pPr lvl="1" marL="169021" indent="0" defTabSz="288036">
+            <a:pPr lvl="1" marL="0" indent="169021" defTabSz="288036">
               <a:spcBef>
                 <a:spcPts val="200"/>
               </a:spcBef>
               <a:buSzTx/>
               <a:buNone/>
-              <a:defRPr sz="1260"/>
+              <a:defRPr sz="1200"/>
             </a:pPr>
             <a:r>
               <a:t>Interoperability adaptors, e.g. OPC-UA, Z-wave, Modbus-TCP, …</a:t>
             </a:r>
           </a:p>
           <a:p>
-            <a:pPr lvl="1" marL="169021" indent="0" defTabSz="288036">
+            <a:pPr lvl="1" marL="0" indent="169021" defTabSz="288036">
               <a:spcBef>
                 <a:spcPts val="200"/>
               </a:spcBef>
               <a:buSzTx/>
               <a:buNone/>
-              <a:defRPr sz="1260"/>
+              <a:defRPr sz="1200"/>
             </a:pPr>
             <a:r>
               <a:t>Tool adaptors</a:t>
             </a:r>
           </a:p>
           <a:p>
-            <a:pPr lvl="1" marL="169021" indent="0" defTabSz="288036">
+            <a:pPr lvl="1" marL="0" indent="169021" defTabSz="288036">
               <a:spcBef>
                 <a:spcPts val="200"/>
               </a:spcBef>
               <a:buSzTx/>
               <a:buNone/>
-              <a:defRPr sz="1260"/>
+              <a:defRPr sz="1200"/>
             </a:pPr>
             <a:r>
               <a:t>Application system examples</a:t>
             </a:r>
           </a:p>
           <a:p>
-            <a:pPr lvl="2" marL="169021" indent="587073" defTabSz="288036">
+            <a:pPr lvl="2" marL="0" indent="756093" defTabSz="288036">
               <a:spcBef>
                 <a:spcPts val="200"/>
               </a:spcBef>
               <a:buSzTx/>
               <a:buNone/>
-              <a:defRPr sz="1260"/>
+              <a:defRPr sz="1200"/>
             </a:pPr>
             <a:r>
               <a:t>Arrowhead SysD and SD documentation</a:t>
@@ -3962,91 +3977,91 @@
             <a:br/>
           </a:p>
           <a:p>
-            <a:pPr lvl="1" marL="169021" indent="0" defTabSz="288036">
+            <a:pPr lvl="1" marL="0" indent="169021" defTabSz="288036">
               <a:spcBef>
                 <a:spcPts val="200"/>
               </a:spcBef>
               <a:buSzTx/>
               <a:buNone/>
-              <a:defRPr sz="1260"/>
+              <a:defRPr sz="1200"/>
             </a:pPr>
             <a:r>
               <a:t>Wiki addressing</a:t>
             </a:r>
           </a:p>
           <a:p>
-            <a:pPr lvl="2" marL="169021" indent="587073" defTabSz="288036">
+            <a:pPr lvl="2" marL="0" indent="756093" defTabSz="288036">
               <a:spcBef>
                 <a:spcPts val="200"/>
               </a:spcBef>
               <a:buSzTx/>
               <a:buNone/>
-              <a:defRPr sz="1260"/>
+              <a:defRPr sz="1200"/>
             </a:pPr>
             <a:r>
               <a:t>application SoS architecting</a:t>
             </a:r>
           </a:p>
           <a:p>
-            <a:pPr lvl="2" marL="169021" indent="587073" defTabSz="288036">
+            <a:pPr lvl="2" marL="0" indent="756093" defTabSz="288036">
               <a:spcBef>
                 <a:spcPts val="200"/>
               </a:spcBef>
               <a:buSzTx/>
               <a:buNone/>
-              <a:defRPr sz="1260"/>
+              <a:defRPr sz="1200"/>
             </a:pPr>
             <a:r>
               <a:t>application SoS modeling (SysML)</a:t>
             </a:r>
           </a:p>
           <a:p>
-            <a:pPr lvl="2" marL="169021" indent="587073" defTabSz="288036">
+            <a:pPr lvl="2" marL="0" indent="756093" defTabSz="288036">
               <a:spcBef>
                 <a:spcPts val="200"/>
               </a:spcBef>
               <a:buSzTx/>
               <a:buNone/>
-              <a:defRPr sz="1260"/>
+              <a:defRPr sz="1200"/>
             </a:pPr>
             <a:r>
               <a:t>application SoS implementation </a:t>
             </a:r>
           </a:p>
           <a:p>
-            <a:pPr lvl="3" marL="169021" indent="900825" defTabSz="288036">
+            <a:pPr lvl="3" marL="0" indent="1069845" defTabSz="288036">
               <a:spcBef>
                 <a:spcPts val="200"/>
               </a:spcBef>
               <a:buSzTx/>
               <a:buNone/>
-              <a:defRPr sz="1260"/>
+              <a:defRPr sz="1200"/>
             </a:pPr>
             <a:r>
               <a:t>references to developers documentation</a:t>
             </a:r>
           </a:p>
           <a:p>
-            <a:pPr lvl="2" marL="169021" indent="587073" defTabSz="288036">
+            <a:pPr lvl="2" marL="0" indent="756093" defTabSz="288036">
               <a:spcBef>
                 <a:spcPts val="200"/>
               </a:spcBef>
               <a:buSzTx/>
               <a:buNone/>
-              <a:defRPr sz="1260"/>
+              <a:defRPr sz="1200"/>
             </a:pPr>
             <a:r>
               <a:t>Success storys</a:t>
             </a:r>
           </a:p>
           <a:p>
-            <a:pPr lvl="1" marL="169021" indent="0" defTabSz="288036">
+            <a:pPr lvl="1" marL="0" indent="169021" defTabSz="288036">
               <a:spcBef>
                 <a:spcPts val="200"/>
               </a:spcBef>
               <a:buSzTx/>
               <a:buNone/>
-              <a:defRPr sz="1260"/>
+              <a:defRPr sz="1200"/>
             </a:pPr>
             <a:r>
               <a:t>Videos</a:t>
@@ -4089,6 +4104,10 @@
           </p:nvPr>
         </p:nvSpPr>
         <p:spPr>
+          <a:xfrm>
+            <a:off x="799889" y="598564"/>
+            <a:ext cx="7444938" cy="586590"/>
+          </a:xfrm>
           <a:prstGeom prst="rect">
             <a:avLst/>
           </a:prstGeom>
@@ -4129,46 +4148,46 @@
               <a:spcBef>
                 <a:spcPts val="200"/>
               </a:spcBef>
-              <a:defRPr sz="1380"/>
+              <a:defRPr sz="1300"/>
             </a:pPr>
             <a:r>
               <a:t>Targeting</a:t>
             </a:r>
           </a:p>
           <a:p>
-            <a:pPr lvl="1" marL="185118" indent="130349" defTabSz="315468">
+            <a:pPr lvl="1" marL="0" indent="315466" defTabSz="315468">
               <a:spcBef>
                 <a:spcPts val="200"/>
               </a:spcBef>
               <a:buSzTx/>
               <a:buNone/>
-              <a:defRPr sz="1380"/>
+              <a:defRPr sz="1300"/>
             </a:pPr>
             <a:r>
               <a:t>IT architects</a:t>
             </a:r>
           </a:p>
           <a:p>
-            <a:pPr lvl="1" marL="185118" indent="130349" defTabSz="315468">
+            <a:pPr lvl="1" marL="0" indent="315466" defTabSz="315468">
               <a:spcBef>
                 <a:spcPts val="200"/>
               </a:spcBef>
               <a:buSzTx/>
               <a:buNone/>
-              <a:defRPr sz="1380"/>
+              <a:defRPr sz="1300"/>
             </a:pPr>
             <a:r>
               <a:t>IT solution engineers</a:t>
             </a:r>
           </a:p>
           <a:p>
-            <a:pPr lvl="1" marL="185118" indent="130349" defTabSz="315468">
+            <a:pPr lvl="1" marL="0" indent="315466" defTabSz="315468">
               <a:spcBef>
                 <a:spcPts val="200"/>
               </a:spcBef>
               <a:buSzTx/>
               <a:buNone/>
-              <a:defRPr sz="1380"/>
+              <a:defRPr sz="1300"/>
             </a:pPr>
           </a:p>
           <a:p>
@@ -4176,7 +4195,7 @@
               <a:spcBef>
                 <a:spcPts val="200"/>
               </a:spcBef>
-              <a:defRPr sz="1380"/>
+              <a:defRPr sz="1300"/>
             </a:pPr>
             <a:r>
               <a:t>Primary location </a:t>
@@ -4197,65 +4216,65 @@
             </a:r>
           </a:p>
           <a:p>
-            <a:pPr lvl="1" marL="185118" indent="0" defTabSz="315468">
+            <a:pPr lvl="1" marL="0" indent="185118" defTabSz="315468">
               <a:spcBef>
                 <a:spcPts val="200"/>
               </a:spcBef>
               <a:buSzTx/>
               <a:buNone/>
-              <a:defRPr sz="1380"/>
+              <a:defRPr sz="1300"/>
             </a:pPr>
             <a:r>
               <a:t>Core system documentation in each core system directory</a:t>
             </a:r>
           </a:p>
           <a:p>
-            <a:pPr lvl="1" marL="185118" indent="0" defTabSz="315468">
+            <a:pPr lvl="1" marL="0" indent="185118" defTabSz="315468">
               <a:spcBef>
                 <a:spcPts val="200"/>
               </a:spcBef>
               <a:buSzTx/>
               <a:buNone/>
-              <a:defRPr sz="1380"/>
+              <a:defRPr sz="1300"/>
             </a:pPr>
             <a:r>
               <a:t>Interoperability adaptors, e.g. OPC-UA, Z-wave, Modbus-TCP, …</a:t>
             </a:r>
           </a:p>
           <a:p>
-            <a:pPr lvl="1" marL="185118" indent="0" defTabSz="315468">
+            <a:pPr lvl="1" marL="0" indent="185118" defTabSz="315468">
               <a:spcBef>
                 <a:spcPts val="200"/>
               </a:spcBef>
               <a:buSzTx/>
               <a:buNone/>
-              <a:defRPr sz="1380"/>
+              <a:defRPr sz="1300"/>
             </a:pPr>
             <a:r>
               <a:t>Tool interoperability adaptors</a:t>
             </a:r>
           </a:p>
           <a:p>
-            <a:pPr lvl="1" marL="185118" indent="0" defTabSz="315468">
+            <a:pPr lvl="1" marL="0" indent="185118" defTabSz="315468">
               <a:spcBef>
                 <a:spcPts val="200"/>
               </a:spcBef>
               <a:buSzTx/>
               <a:buNone/>
-              <a:defRPr sz="1380"/>
+              <a:defRPr sz="1300"/>
             </a:pPr>
             <a:r>
               <a:t>Application system examples</a:t>
             </a:r>
           </a:p>
           <a:p>
-            <a:pPr lvl="2" marL="185118" indent="642984" defTabSz="315468">
+            <a:pPr lvl="2" marL="0" indent="828101" defTabSz="315468">
               <a:spcBef>
                 <a:spcPts val="200"/>
               </a:spcBef>
               <a:buSzTx/>
               <a:buNone/>
-              <a:defRPr sz="1380"/>
+              <a:defRPr sz="1300"/>
             </a:pPr>
             <a:r>
               <a:t>Arrowhead SysD and SD documentation</a:t>
@@ -4263,78 +4282,78 @@
             <a:br/>
           </a:p>
           <a:p>
-            <a:pPr lvl="1" marL="185118" indent="0" defTabSz="315468">
+            <a:pPr lvl="1" marL="0" indent="185118" defTabSz="315468">
               <a:spcBef>
                 <a:spcPts val="200"/>
               </a:spcBef>
               <a:buSzTx/>
               <a:buNone/>
-              <a:defRPr sz="1380"/>
+              <a:defRPr sz="1300"/>
             </a:pPr>
             <a:r>
               <a:t>Wiki addressing</a:t>
             </a:r>
           </a:p>
           <a:p>
-            <a:pPr lvl="2" marL="185118" indent="642984" defTabSz="315468">
+            <a:pPr lvl="2" marL="0" indent="828101" defTabSz="315468">
               <a:spcBef>
                 <a:spcPts val="200"/>
               </a:spcBef>
               <a:buSzTx/>
               <a:buNone/>
-              <a:defRPr sz="1380"/>
+              <a:defRPr sz="1300"/>
             </a:pPr>
             <a:r>
               <a:t>application SoS architecting</a:t>
             </a:r>
           </a:p>
           <a:p>
-            <a:pPr lvl="2" marL="185118" indent="642984" defTabSz="315468">
+            <a:pPr lvl="2" marL="0" indent="828101" defTabSz="315468">
               <a:spcBef>
                 <a:spcPts val="200"/>
               </a:spcBef>
               <a:buSzTx/>
               <a:buNone/>
-              <a:defRPr sz="1380"/>
+              <a:defRPr sz="1300"/>
             </a:pPr>
             <a:r>
               <a:t>application SoS modeling (SysML)</a:t>
             </a:r>
           </a:p>
           <a:p>
-            <a:pPr lvl="2" marL="185118" indent="642984" defTabSz="315468">
+            <a:pPr lvl="2" marL="0" indent="828101" defTabSz="315468">
               <a:spcBef>
                 <a:spcPts val="200"/>
               </a:spcBef>
               <a:buSzTx/>
               <a:buNone/>
-              <a:defRPr sz="1380"/>
+              <a:defRPr sz="1300"/>
             </a:pPr>
             <a:r>
               <a:t>application SoS implementation </a:t>
             </a:r>
           </a:p>
           <a:p>
-            <a:pPr lvl="3" marL="185118" indent="986618" defTabSz="315468">
+            <a:pPr lvl="3" marL="0" indent="1171735" defTabSz="315468">
               <a:spcBef>
                 <a:spcPts val="200"/>
               </a:spcBef>
               <a:buSzTx/>
               <a:buNone/>
-              <a:defRPr sz="1380"/>
+              <a:defRPr sz="1300"/>
             </a:pPr>
             <a:r>
               <a:t>references to developers documentation</a:t>
             </a:r>
           </a:p>
           <a:p>
-            <a:pPr lvl="2" marL="185118" indent="642984" defTabSz="315468">
+            <a:pPr lvl="2" marL="0" indent="828101" defTabSz="315468">
               <a:spcBef>
                 <a:spcPts val="200"/>
               </a:spcBef>
               <a:buSzTx/>
               <a:buNone/>
-              <a:defRPr sz="1380"/>
+              <a:defRPr sz="1300"/>
             </a:pPr>
             <a:r>
               <a:t>Success storys</a:t>
@@ -4377,6 +4396,10 @@
           </p:nvPr>
         </p:nvSpPr>
         <p:spPr>
+          <a:xfrm>
+            <a:off x="799889" y="598564"/>
+            <a:ext cx="7444938" cy="586590"/>
+          </a:xfrm>
           <a:prstGeom prst="rect">
             <a:avLst/>
           </a:prstGeom>
@@ -4385,7 +4408,7 @@
           <a:bodyPr/>
           <a:lstStyle>
             <a:lvl1pPr defTabSz="434340">
-              <a:defRPr sz="3420"/>
+              <a:defRPr sz="3400"/>
             </a:lvl1pPr>
           </a:lstStyle>
           <a:p>
@@ -4417,58 +4440,58 @@
           <a:bodyPr/>
           <a:lstStyle/>
           <a:p>
-            <a:pPr marL="222679" indent="-222679" defTabSz="379475">
+            <a:pPr marL="222678" indent="-222678" defTabSz="379474">
               <a:spcBef>
                 <a:spcPts val="300"/>
               </a:spcBef>
-              <a:defRPr sz="1660"/>
+              <a:defRPr sz="1600"/>
             </a:pPr>
             <a:r>
               <a:t>Targeting</a:t>
             </a:r>
           </a:p>
           <a:p>
-            <a:pPr lvl="1" marL="222679" indent="156796" defTabSz="379475">
+            <a:pPr lvl="1" marL="0" indent="379474" defTabSz="379474">
               <a:spcBef>
                 <a:spcPts val="300"/>
               </a:spcBef>
               <a:buSzTx/>
               <a:buNone/>
-              <a:defRPr sz="1660"/>
+              <a:defRPr sz="1600"/>
             </a:pPr>
             <a:r>
               <a:t>Automation managers</a:t>
             </a:r>
           </a:p>
           <a:p>
-            <a:pPr lvl="1" marL="222679" indent="156796" defTabSz="379475">
+            <a:pPr lvl="1" marL="0" indent="379474" defTabSz="379474">
               <a:spcBef>
                 <a:spcPts val="300"/>
               </a:spcBef>
               <a:buSzTx/>
               <a:buNone/>
-              <a:defRPr sz="1660"/>
+              <a:defRPr sz="1600"/>
             </a:pPr>
             <a:r>
               <a:t>CIO’s</a:t>
             </a:r>
           </a:p>
           <a:p>
-            <a:pPr lvl="1" marL="222679" indent="156796" defTabSz="379475">
+            <a:pPr lvl="1" marL="0" indent="379474" defTabSz="379474">
               <a:spcBef>
                 <a:spcPts val="300"/>
               </a:spcBef>
               <a:buSzTx/>
               <a:buNone/>
-              <a:defRPr sz="1660"/>
-            </a:pPr>
-          </a:p>
-          <a:p>
-            <a:pPr marL="222679" indent="-222679" defTabSz="379475">
+              <a:defRPr sz="1600"/>
+            </a:pPr>
+          </a:p>
+          <a:p>
+            <a:pPr marL="222678" indent="-222678" defTabSz="379474">
               <a:spcBef>
                 <a:spcPts val="300"/>
               </a:spcBef>
-              <a:defRPr sz="1660"/>
+              <a:defRPr sz="1600"/>
             </a:pPr>
             <a:r>
               <a:t>Primary location </a:t>
@@ -4489,49 +4512,49 @@
             </a:r>
           </a:p>
           <a:p>
-            <a:pPr lvl="1" marL="222679" indent="0" defTabSz="379475">
+            <a:pPr lvl="1" marL="0" indent="222678" defTabSz="379474">
               <a:spcBef>
                 <a:spcPts val="300"/>
               </a:spcBef>
               <a:buSzTx/>
               <a:buNone/>
-              <a:defRPr sz="1660"/>
+              <a:defRPr sz="1600"/>
             </a:pPr>
             <a:r>
               <a:t>Global architecture documentation </a:t>
             </a:r>
           </a:p>
           <a:p>
-            <a:pPr lvl="2" marL="222679" indent="773445" defTabSz="379475">
+            <a:pPr lvl="2" marL="0" indent="996123" defTabSz="379474">
               <a:spcBef>
                 <a:spcPts val="300"/>
               </a:spcBef>
               <a:buSzTx/>
               <a:buNone/>
-              <a:defRPr sz="1660"/>
+              <a:defRPr sz="1600"/>
             </a:pPr>
             <a:r>
               <a:t>Arrowhead SoSD documentation</a:t>
             </a:r>
           </a:p>
           <a:p>
-            <a:pPr lvl="1" marL="222679" indent="0" defTabSz="379475">
+            <a:pPr lvl="1" marL="0" indent="222678" defTabSz="379474">
               <a:spcBef>
                 <a:spcPts val="300"/>
               </a:spcBef>
               <a:buSzTx/>
               <a:buNone/>
-              <a:defRPr sz="1660"/>
-            </a:pPr>
-          </a:p>
-          <a:p>
-            <a:pPr lvl="1" marL="222679" indent="0" defTabSz="379475">
+              <a:defRPr sz="1600"/>
+            </a:pPr>
+          </a:p>
+          <a:p>
+            <a:pPr lvl="1" marL="0" indent="222678" defTabSz="379474">
               <a:spcBef>
                 <a:spcPts val="300"/>
               </a:spcBef>
               <a:buSzTx/>
               <a:buNone/>
-              <a:defRPr sz="1660"/>
+              <a:defRPr sz="1600"/>
             </a:pPr>
             <a:r>
               <a:t>Youtube - High level videos</a:t>
@@ -4539,52 +4562,52 @@
             <a:br/>
           </a:p>
           <a:p>
-            <a:pPr lvl="1" marL="222679" indent="0" defTabSz="379475">
+            <a:pPr lvl="1" marL="0" indent="222678" defTabSz="379474">
               <a:spcBef>
                 <a:spcPts val="300"/>
               </a:spcBef>
               <a:buSzTx/>
               <a:buNone/>
-              <a:defRPr sz="1660"/>
+              <a:defRPr sz="1600"/>
             </a:pPr>
             <a:r>
               <a:t>Wiki addressing</a:t>
             </a:r>
           </a:p>
           <a:p>
-            <a:pPr lvl="2" marL="222679" indent="773445" defTabSz="379475">
+            <a:pPr lvl="2" marL="0" indent="996123" defTabSz="379474">
               <a:spcBef>
                 <a:spcPts val="300"/>
               </a:spcBef>
               <a:buSzTx/>
               <a:buNone/>
-              <a:defRPr sz="1660"/>
+              <a:defRPr sz="1600"/>
             </a:pPr>
             <a:r>
               <a:t>Solution SoS architecture and capabilities</a:t>
             </a:r>
           </a:p>
           <a:p>
-            <a:pPr lvl="2" marL="222679" indent="773445" defTabSz="379475">
+            <a:pPr lvl="2" marL="0" indent="996123" defTabSz="379474">
               <a:spcBef>
                 <a:spcPts val="300"/>
               </a:spcBef>
               <a:buSzTx/>
               <a:buNone/>
-              <a:defRPr sz="1660"/>
+              <a:defRPr sz="1600"/>
             </a:pPr>
             <a:r>
               <a:t>Engineering process and tools</a:t>
             </a:r>
           </a:p>
           <a:p>
-            <a:pPr lvl="2" marL="222679" indent="773445" defTabSz="379475">
+            <a:pPr lvl="2" marL="0" indent="996123" defTabSz="379474">
               <a:spcBef>
                 <a:spcPts val="300"/>
               </a:spcBef>
               <a:buSzTx/>
               <a:buNone/>
-              <a:defRPr sz="1660"/>
+              <a:defRPr sz="1600"/>
             </a:pPr>
             <a:r>
               <a:t>Success storys</a:t>
@@ -4627,6 +4650,10 @@
           </p:nvPr>
         </p:nvSpPr>
         <p:spPr>
+          <a:xfrm>
+            <a:off x="799889" y="598564"/>
+            <a:ext cx="7444938" cy="586590"/>
+          </a:xfrm>
           <a:prstGeom prst="rect">
             <a:avLst/>
           </a:prstGeom>
@@ -4652,8 +4679,8 @@
         </p:nvSpPr>
         <p:spPr>
           <a:xfrm>
-            <a:off x="799889" y="1185151"/>
-            <a:ext cx="7444938" cy="4071833"/>
+            <a:off x="799889" y="1185150"/>
+            <a:ext cx="7444938" cy="4071834"/>
           </a:xfrm>
           <a:prstGeom prst="rect">
             <a:avLst/>
@@ -4667,46 +4694,46 @@
               <a:spcBef>
                 <a:spcPts val="300"/>
               </a:spcBef>
-              <a:defRPr sz="1779"/>
+              <a:defRPr sz="1700"/>
             </a:pPr>
             <a:r>
               <a:t>Targeting</a:t>
             </a:r>
           </a:p>
           <a:p>
-            <a:pPr lvl="1" marL="238776" indent="168131" defTabSz="406908">
+            <a:pPr lvl="1" marL="0" indent="406906" defTabSz="406908">
               <a:spcBef>
                 <a:spcPts val="300"/>
               </a:spcBef>
               <a:buSzTx/>
               <a:buNone/>
-              <a:defRPr sz="1779"/>
+              <a:defRPr sz="1700"/>
             </a:pPr>
             <a:r>
               <a:t>Politicians and </a:t>
             </a:r>
           </a:p>
           <a:p>
-            <a:pPr lvl="1" marL="238776" indent="168131" defTabSz="406908">
+            <a:pPr lvl="1" marL="0" indent="406906" defTabSz="406908">
               <a:spcBef>
                 <a:spcPts val="300"/>
               </a:spcBef>
               <a:buSzTx/>
               <a:buNone/>
-              <a:defRPr sz="1779"/>
+              <a:defRPr sz="1700"/>
             </a:pPr>
             <a:r>
               <a:t>PA officers</a:t>
             </a:r>
           </a:p>
           <a:p>
-            <a:pPr lvl="1" marL="238776" indent="168131" defTabSz="406908">
+            <a:pPr lvl="1" marL="0" indent="406906" defTabSz="406908">
               <a:spcBef>
                 <a:spcPts val="300"/>
               </a:spcBef>
               <a:buSzTx/>
               <a:buNone/>
-              <a:defRPr sz="1779"/>
+              <a:defRPr sz="1700"/>
             </a:pPr>
           </a:p>
           <a:p>
@@ -4714,7 +4741,7 @@
               <a:spcBef>
                 <a:spcPts val="300"/>
               </a:spcBef>
-              <a:defRPr sz="1779"/>
+              <a:defRPr sz="1700"/>
             </a:pPr>
             <a:r>
               <a:t>Primary location </a:t>
@@ -4735,88 +4762,88 @@
             </a:r>
           </a:p>
           <a:p>
-            <a:pPr lvl="2" marL="238776" indent="829357" defTabSz="406908">
+            <a:pPr lvl="2" marL="0" indent="1068133" defTabSz="406908">
               <a:spcBef>
                 <a:spcPts val="300"/>
               </a:spcBef>
               <a:buSzTx/>
               <a:buNone/>
-              <a:defRPr sz="1779"/>
-            </a:pPr>
-          </a:p>
-          <a:p>
-            <a:pPr lvl="1" marL="238776" indent="0" defTabSz="406908">
+              <a:defRPr sz="1700"/>
+            </a:pPr>
+          </a:p>
+          <a:p>
+            <a:pPr lvl="1" marL="0" indent="238776" defTabSz="406908">
               <a:spcBef>
                 <a:spcPts val="300"/>
               </a:spcBef>
               <a:buSzTx/>
               <a:buNone/>
-              <a:defRPr sz="1779"/>
+              <a:defRPr sz="1700"/>
             </a:pPr>
             <a:r>
               <a:t>Wiki addressing</a:t>
             </a:r>
           </a:p>
           <a:p>
-            <a:pPr lvl="2" marL="238776" indent="829357" defTabSz="406908">
+            <a:pPr lvl="2" marL="0" indent="1068133" defTabSz="406908">
               <a:spcBef>
                 <a:spcPts val="300"/>
               </a:spcBef>
               <a:buSzTx/>
               <a:buNone/>
-              <a:defRPr sz="1779"/>
+              <a:defRPr sz="1700"/>
             </a:pPr>
             <a:r>
               <a:t>Success storys</a:t>
             </a:r>
           </a:p>
           <a:p>
-            <a:pPr lvl="3" marL="238776" indent="1272594" defTabSz="406908">
+            <a:pPr lvl="3" marL="0" indent="1511370" defTabSz="406908">
               <a:spcBef>
                 <a:spcPts val="300"/>
               </a:spcBef>
               <a:buSzTx/>
               <a:buNone/>
-              <a:defRPr sz="1779"/>
+              <a:defRPr sz="1700"/>
             </a:pPr>
             <a:r>
               <a:t>Solution SoS architecture and capabilities</a:t>
             </a:r>
           </a:p>
           <a:p>
-            <a:pPr lvl="3" marL="238776" indent="1272594" defTabSz="406908">
+            <a:pPr lvl="3" marL="0" indent="1511370" defTabSz="406908">
               <a:spcBef>
                 <a:spcPts val="300"/>
               </a:spcBef>
               <a:buSzTx/>
               <a:buNone/>
-              <a:defRPr sz="1779"/>
+              <a:defRPr sz="1700"/>
             </a:pPr>
             <a:r>
               <a:t>Engineering process and tools</a:t>
             </a:r>
           </a:p>
           <a:p>
-            <a:pPr lvl="1" marL="238776" indent="0" defTabSz="406908">
+            <a:pPr lvl="1" marL="0" indent="238776" defTabSz="406908">
               <a:spcBef>
                 <a:spcPts val="300"/>
               </a:spcBef>
               <a:buSzTx/>
               <a:buNone/>
-              <a:defRPr sz="1779"/>
+              <a:defRPr sz="1700"/>
             </a:pPr>
             <a:r>
               <a:t>Youtube</a:t>
             </a:r>
           </a:p>
           <a:p>
-            <a:pPr lvl="2" marL="238776" indent="829357" defTabSz="406908">
+            <a:pPr lvl="2" marL="0" indent="1068133" defTabSz="406908">
               <a:spcBef>
                 <a:spcPts val="300"/>
               </a:spcBef>
               <a:buSzTx/>
               <a:buNone/>
-              <a:defRPr sz="1779"/>
+              <a:defRPr sz="1700"/>
             </a:pPr>
             <a:r>
               <a:t>High level videos</a:t>
@@ -4861,7 +4888,7 @@
         <p:spPr>
           <a:xfrm>
             <a:off x="799889" y="598565"/>
-            <a:ext cx="7444938" cy="586589"/>
+            <a:ext cx="7444938" cy="586590"/>
           </a:xfrm>
           <a:prstGeom prst="rect">
             <a:avLst/>
@@ -4888,8 +4915,8 @@
         </p:nvSpPr>
         <p:spPr>
           <a:xfrm>
-            <a:off x="799889" y="1185150"/>
-            <a:ext cx="7444938" cy="4529852"/>
+            <a:off x="799889" y="1185149"/>
+            <a:ext cx="7444938" cy="4529854"/>
           </a:xfrm>
           <a:prstGeom prst="rect">
             <a:avLst/>
@@ -4945,9 +4972,8 @@
             </a:r>
           </a:p>
           <a:p>
-            <a:pPr/>
-            <a:r>
-              <a:rPr u="sng">
+            <a:pPr>
+              <a:defRPr u="sng">
                 <a:solidFill>
                   <a:srgbClr val="0000FF"/>
                 </a:solidFill>
@@ -4956,6 +4982,10 @@
                     <a:srgbClr val="0000FF"/>
                   </a:solidFill>
                 </a:uFill>
+              </a:defRPr>
+            </a:pPr>
+            <a:r>
+              <a:rPr>
                 <a:hlinkClick r:id="rId4" invalidUrl="" action="" tgtFrame="" tooltip="" history="1" highlightClick="0" endSnd="0"/>
               </a:rPr>
               <a:t>www.arrowhead.eu/eclipse_arrowhead</a:t>
@@ -4999,8 +5029,8 @@
         </p:nvSpPr>
         <p:spPr>
           <a:xfrm>
-            <a:off x="799889" y="157717"/>
-            <a:ext cx="7444938" cy="586590"/>
+            <a:off x="799889" y="157716"/>
+            <a:ext cx="7444938" cy="586592"/>
           </a:xfrm>
           <a:prstGeom prst="rect">
             <a:avLst/>
@@ -5049,7 +5079,7 @@
             </a:r>
           </a:p>
           <a:p>
-            <a:pPr lvl="1" marL="0" indent="406906" defTabSz="406908">
+            <a:pPr lvl="1" marL="0" indent="406905" defTabSz="406908">
               <a:spcBef>
                 <a:spcPts val="300"/>
               </a:spcBef>
@@ -5085,7 +5115,7 @@
             </a:r>
           </a:p>
           <a:p>
-            <a:pPr lvl="1" marL="0" indent="406906" defTabSz="406908">
+            <a:pPr lvl="1" marL="0" indent="406905" defTabSz="406908">
               <a:spcBef>
                 <a:spcPts val="300"/>
               </a:spcBef>
@@ -5110,7 +5140,7 @@
             </a:r>
           </a:p>
           <a:p>
-            <a:pPr lvl="1" marL="0" indent="406906" defTabSz="406908">
+            <a:pPr lvl="1" marL="0" indent="406905" defTabSz="406908">
               <a:spcBef>
                 <a:spcPts val="300"/>
               </a:spcBef>
@@ -5135,7 +5165,7 @@
             </a:r>
           </a:p>
           <a:p>
-            <a:pPr marL="169543" indent="-169543" defTabSz="406908">
+            <a:pPr marL="169542" indent="-169542" defTabSz="406908">
               <a:spcBef>
                 <a:spcPts val="500"/>
               </a:spcBef>
@@ -5157,7 +5187,7 @@
             </a:r>
           </a:p>
           <a:p>
-            <a:pPr marL="169543" indent="-169543" defTabSz="406908">
+            <a:pPr marL="169542" indent="-169542" defTabSz="406908">
               <a:spcBef>
                 <a:spcPts val="500"/>
               </a:spcBef>
@@ -5179,7 +5209,7 @@
             </a:r>
           </a:p>
           <a:p>
-            <a:pPr marL="169543" indent="-169543" defTabSz="406908">
+            <a:pPr marL="169542" indent="-169542" defTabSz="406908">
               <a:spcBef>
                 <a:spcPts val="500"/>
               </a:spcBef>
@@ -5201,7 +5231,7 @@
             </a:r>
           </a:p>
           <a:p>
-            <a:pPr marL="169543" indent="-169543" defTabSz="406908">
+            <a:pPr marL="169542" indent="-169542" defTabSz="406908">
               <a:spcBef>
                 <a:spcPts val="500"/>
               </a:spcBef>
@@ -5223,7 +5253,7 @@
             </a:r>
           </a:p>
           <a:p>
-            <a:pPr marL="169543" indent="-169543" defTabSz="406908">
+            <a:pPr marL="169542" indent="-169542" defTabSz="406908">
               <a:spcBef>
                 <a:spcPts val="500"/>
               </a:spcBef>
@@ -5245,7 +5275,7 @@
             </a:r>
           </a:p>
           <a:p>
-            <a:pPr marL="169543" indent="-169543" defTabSz="406908">
+            <a:pPr marL="169542" indent="-169542" defTabSz="406908">
               <a:spcBef>
                 <a:spcPts val="500"/>
               </a:spcBef>
@@ -5267,7 +5297,7 @@
             </a:r>
           </a:p>
           <a:p>
-            <a:pPr marL="169543" indent="-169543" defTabSz="406908">
+            <a:pPr marL="169542" indent="-169542" defTabSz="406908">
               <a:spcBef>
                 <a:spcPts val="500"/>
               </a:spcBef>
@@ -5289,7 +5319,7 @@
             </a:r>
           </a:p>
           <a:p>
-            <a:pPr marL="169543" indent="-169543" defTabSz="406908">
+            <a:pPr marL="169542" indent="-169542" defTabSz="406908">
               <a:spcBef>
                 <a:spcPts val="500"/>
               </a:spcBef>
@@ -5349,7 +5379,7 @@
         <p:spPr>
           <a:xfrm>
             <a:off x="799889" y="612784"/>
-            <a:ext cx="7444938" cy="586590"/>
+            <a:ext cx="7444938" cy="586591"/>
           </a:xfrm>
           <a:prstGeom prst="rect">
             <a:avLst/>
@@ -5376,8 +5406,8 @@
         </p:nvSpPr>
         <p:spPr>
           <a:xfrm>
-            <a:off x="799889" y="1185150"/>
-            <a:ext cx="7444938" cy="4529852"/>
+            <a:off x="799889" y="1185149"/>
+            <a:ext cx="7444938" cy="4529854"/>
           </a:xfrm>
           <a:prstGeom prst="rect">
             <a:avLst/>
@@ -5393,7 +5423,7 @@
             </a:r>
           </a:p>
           <a:p>
-            <a:pPr lvl="1" marL="0" indent="457199">
+            <a:pPr lvl="1" marL="0" indent="457198">
               <a:buSzTx/>
               <a:buNone/>
             </a:pPr>
@@ -5411,7 +5441,7 @@
             </a:r>
           </a:p>
           <a:p>
-            <a:pPr lvl="1" marL="0" indent="457199">
+            <a:pPr lvl="1" marL="0" indent="457198">
               <a:buSzTx/>
               <a:buNone/>
             </a:pPr>
@@ -5420,7 +5450,7 @@
             </a:r>
           </a:p>
           <a:p>
-            <a:pPr lvl="1" marL="0" indent="457199">
+            <a:pPr lvl="1" marL="0" indent="457198">
               <a:buSzTx/>
               <a:buNone/>
             </a:pPr>
@@ -5432,7 +5462,7 @@
             </a:r>
           </a:p>
           <a:p>
-            <a:pPr lvl="1" marL="0" indent="457199">
+            <a:pPr lvl="1" marL="0" indent="457198">
               <a:buSzTx/>
               <a:buNone/>
             </a:pPr>
@@ -5479,7 +5509,7 @@
         <p:spPr>
           <a:xfrm>
             <a:off x="799889" y="598565"/>
-            <a:ext cx="7444938" cy="586589"/>
+            <a:ext cx="7444938" cy="586590"/>
           </a:xfrm>
           <a:prstGeom prst="rect">
             <a:avLst/>
@@ -5510,8 +5540,8 @@
         </p:nvSpPr>
         <p:spPr>
           <a:xfrm>
-            <a:off x="799889" y="1185150"/>
-            <a:ext cx="7444938" cy="4529852"/>
+            <a:off x="799889" y="1185149"/>
+            <a:ext cx="7444938" cy="4529854"/>
           </a:xfrm>
           <a:prstGeom prst="rect">
             <a:avLst/>
@@ -5532,7 +5562,7 @@
             </a:r>
           </a:p>
           <a:p>
-            <a:pPr lvl="1" marL="0" indent="406906" defTabSz="406908">
+            <a:pPr lvl="1" marL="0" indent="406905" defTabSz="406908">
               <a:spcBef>
                 <a:spcPts val="300"/>
               </a:spcBef>
@@ -5545,7 +5575,7 @@
             </a:r>
           </a:p>
           <a:p>
-            <a:pPr lvl="2" marL="0" indent="813814" defTabSz="406908">
+            <a:pPr lvl="2" marL="0" indent="813813" defTabSz="406908">
               <a:spcBef>
                 <a:spcPts val="300"/>
               </a:spcBef>
@@ -5559,7 +5589,7 @@
             <a:br/>
           </a:p>
           <a:p>
-            <a:pPr lvl="1" marL="0" indent="406906" defTabSz="406908">
+            <a:pPr lvl="1" marL="0" indent="406905" defTabSz="406908">
               <a:spcBef>
                 <a:spcPts val="300"/>
               </a:spcBef>
@@ -5572,7 +5602,7 @@
             </a:r>
           </a:p>
           <a:p>
-            <a:pPr lvl="1" marL="0" indent="406906" defTabSz="406908">
+            <a:pPr lvl="1" marL="0" indent="406905" defTabSz="406908">
               <a:spcBef>
                 <a:spcPts val="300"/>
               </a:spcBef>
@@ -5585,7 +5615,7 @@
             </a:r>
           </a:p>
           <a:p>
-            <a:pPr lvl="1" marL="0" indent="406906" defTabSz="406908">
+            <a:pPr lvl="1" marL="0" indent="406905" defTabSz="406908">
               <a:spcBef>
                 <a:spcPts val="300"/>
               </a:spcBef>
@@ -5598,7 +5628,7 @@
             </a:r>
           </a:p>
           <a:p>
-            <a:pPr lvl="1" marL="0" indent="406906" defTabSz="406908">
+            <a:pPr lvl="1" marL="0" indent="406905" defTabSz="406908">
               <a:spcBef>
                 <a:spcPts val="300"/>
               </a:spcBef>
@@ -5611,7 +5641,7 @@
             </a:r>
           </a:p>
           <a:p>
-            <a:pPr lvl="1" marL="0" indent="406906" defTabSz="406908">
+            <a:pPr lvl="1" marL="0" indent="406905" defTabSz="406908">
               <a:spcBef>
                 <a:spcPts val="300"/>
               </a:spcBef>
@@ -5624,7 +5654,7 @@
             </a:r>
           </a:p>
           <a:p>
-            <a:pPr lvl="1" marL="0" indent="406906" defTabSz="406908">
+            <a:pPr lvl="1" marL="0" indent="406905" defTabSz="406908">
               <a:spcBef>
                 <a:spcPts val="300"/>
               </a:spcBef>
@@ -5637,7 +5667,7 @@
             </a:r>
           </a:p>
           <a:p>
-            <a:pPr lvl="1" marL="0" indent="406906" defTabSz="406908">
+            <a:pPr lvl="1" marL="0" indent="406905" defTabSz="406908">
               <a:spcBef>
                 <a:spcPts val="300"/>
               </a:spcBef>
@@ -5662,7 +5692,7 @@
             </a:r>
           </a:p>
           <a:p>
-            <a:pPr lvl="1" marL="0" indent="406906" defTabSz="406908">
+            <a:pPr lvl="1" marL="0" indent="406905" defTabSz="406908">
               <a:spcBef>
                 <a:spcPts val="300"/>
               </a:spcBef>
@@ -5675,7 +5705,7 @@
             </a:r>
           </a:p>
           <a:p>
-            <a:pPr lvl="1" marL="0" indent="406906" defTabSz="406908">
+            <a:pPr lvl="1" marL="0" indent="406905" defTabSz="406908">
               <a:spcBef>
                 <a:spcPts val="300"/>
               </a:spcBef>
@@ -5726,7 +5756,7 @@
         <p:spPr>
           <a:xfrm>
             <a:off x="799889" y="598565"/>
-            <a:ext cx="7444938" cy="586589"/>
+            <a:ext cx="7444938" cy="586590"/>
           </a:xfrm>
           <a:prstGeom prst="rect">
             <a:avLst/>
@@ -5753,8 +5783,8 @@
         </p:nvSpPr>
         <p:spPr>
           <a:xfrm>
-            <a:off x="799889" y="1185150"/>
-            <a:ext cx="7444938" cy="4529852"/>
+            <a:off x="799889" y="1185149"/>
+            <a:ext cx="7444938" cy="4529854"/>
           </a:xfrm>
           <a:prstGeom prst="rect">
             <a:avLst/>
@@ -5853,7 +5883,7 @@
         <p:spPr>
           <a:xfrm>
             <a:off x="799889" y="598565"/>
-            <a:ext cx="7444938" cy="586589"/>
+            <a:ext cx="7444938" cy="586590"/>
           </a:xfrm>
           <a:prstGeom prst="rect">
             <a:avLst/>
@@ -5880,8 +5910,8 @@
         </p:nvSpPr>
         <p:spPr>
           <a:xfrm>
-            <a:off x="799889" y="1185150"/>
-            <a:ext cx="7444938" cy="4529852"/>
+            <a:off x="799889" y="1185149"/>
+            <a:ext cx="7444938" cy="4529854"/>
           </a:xfrm>
           <a:prstGeom prst="rect">
             <a:avLst/>
@@ -6073,7 +6103,7 @@
         <p:spPr>
           <a:xfrm>
             <a:off x="799889" y="598565"/>
-            <a:ext cx="7444938" cy="586589"/>
+            <a:ext cx="7444938" cy="586590"/>
           </a:xfrm>
           <a:prstGeom prst="rect">
             <a:avLst/>
@@ -6100,8 +6130,8 @@
         </p:nvSpPr>
         <p:spPr>
           <a:xfrm>
-            <a:off x="799889" y="1185150"/>
-            <a:ext cx="7444938" cy="4529852"/>
+            <a:off x="799889" y="1185149"/>
+            <a:ext cx="7444938" cy="4529854"/>
           </a:xfrm>
           <a:prstGeom prst="rect">
             <a:avLst/>
@@ -6195,7 +6225,7 @@
         <p:spPr>
           <a:xfrm>
             <a:off x="799889" y="598565"/>
-            <a:ext cx="7444938" cy="586589"/>
+            <a:ext cx="7444938" cy="586590"/>
           </a:xfrm>
           <a:prstGeom prst="rect">
             <a:avLst/>
@@ -6222,8 +6252,8 @@
         </p:nvSpPr>
         <p:spPr>
           <a:xfrm>
-            <a:off x="799889" y="1185150"/>
-            <a:ext cx="7444938" cy="4529852"/>
+            <a:off x="799889" y="1185149"/>
+            <a:ext cx="7444938" cy="4529854"/>
           </a:xfrm>
           <a:prstGeom prst="rect">
             <a:avLst/>
@@ -6346,7 +6376,7 @@
         <p:spPr>
           <a:xfrm>
             <a:off x="799889" y="598565"/>
-            <a:ext cx="7444938" cy="586589"/>
+            <a:ext cx="7444938" cy="586590"/>
           </a:xfrm>
           <a:prstGeom prst="rect">
             <a:avLst/>
@@ -6373,8 +6403,8 @@
         </p:nvSpPr>
         <p:spPr>
           <a:xfrm>
-            <a:off x="799889" y="1185150"/>
-            <a:ext cx="7444938" cy="4529852"/>
+            <a:off x="799889" y="1185149"/>
+            <a:ext cx="7444938" cy="4529854"/>
           </a:xfrm>
           <a:prstGeom prst="rect">
             <a:avLst/>
@@ -6544,7 +6574,7 @@
         <p:spPr>
           <a:xfrm>
             <a:off x="799889" y="598565"/>
-            <a:ext cx="7444938" cy="586589"/>
+            <a:ext cx="7444938" cy="586590"/>
           </a:xfrm>
           <a:prstGeom prst="rect">
             <a:avLst/>
@@ -6571,8 +6601,8 @@
         </p:nvSpPr>
         <p:spPr>
           <a:xfrm>
-            <a:off x="799889" y="1185150"/>
-            <a:ext cx="8058506" cy="4529852"/>
+            <a:off x="799889" y="1185149"/>
+            <a:ext cx="8058506" cy="4529854"/>
           </a:xfrm>
           <a:prstGeom prst="rect">
             <a:avLst/>
@@ -6692,7 +6722,7 @@
         <p:spPr>
           <a:xfrm>
             <a:off x="799889" y="598565"/>
-            <a:ext cx="7444938" cy="586589"/>
+            <a:ext cx="7444938" cy="586590"/>
           </a:xfrm>
           <a:prstGeom prst="rect">
             <a:avLst/>
@@ -6719,8 +6749,8 @@
         </p:nvSpPr>
         <p:spPr>
           <a:xfrm>
-            <a:off x="799889" y="1185150"/>
-            <a:ext cx="7444938" cy="4529852"/>
+            <a:off x="799889" y="1185149"/>
+            <a:ext cx="8004826" cy="4529854"/>
           </a:xfrm>
           <a:prstGeom prst="rect">
             <a:avLst/>
@@ -6736,7 +6766,7 @@
             </a:r>
           </a:p>
           <a:p>
-            <a:pPr lvl="1" marL="0" indent="457199">
+            <a:pPr lvl="1" marL="0" indent="457198">
               <a:buSzTx/>
               <a:buNone/>
             </a:pPr>
@@ -6745,7 +6775,7 @@
             </a:r>
           </a:p>
           <a:p>
-            <a:pPr lvl="1" marL="0" indent="457199">
+            <a:pPr lvl="1" marL="0" indent="457198">
               <a:buSzTx/>
               <a:buNone/>
             </a:pPr>
@@ -6754,13 +6784,16 @@
             </a:r>
           </a:p>
           <a:p>
-            <a:pPr lvl="1" marL="0" indent="457199">
-              <a:buSzTx/>
-              <a:buNone/>
-            </a:pPr>
-            <a:r>
-              <a:t>Johannes Kristen/Laurenti Barna/Per Olofsson, Requirements owner </a:t>
-            </a:r>
+            <a:pPr lvl="1" marL="0" indent="457198">
+              <a:buSzTx/>
+              <a:buNone/>
+            </a:pPr>
+            <a:r>
+              <a:t>Johannes Kristen/Kjell Bengtsson/Per Olofsson, Requirements</a:t>
+            </a:r>
+          </a:p>
+          <a:p>
+            <a:pPr marL="0" indent="457198"/>
           </a:p>
         </p:txBody>
       </p:sp>
@@ -6801,7 +6834,7 @@
         <p:spPr>
           <a:xfrm>
             <a:off x="799889" y="598565"/>
-            <a:ext cx="7444938" cy="586589"/>
+            <a:ext cx="7444938" cy="586590"/>
           </a:xfrm>
           <a:prstGeom prst="rect">
             <a:avLst/>
@@ -6828,8 +6861,8 @@
         </p:nvSpPr>
         <p:spPr>
           <a:xfrm>
-            <a:off x="799889" y="1185150"/>
-            <a:ext cx="7444938" cy="4529852"/>
+            <a:off x="799889" y="1185149"/>
+            <a:ext cx="7444938" cy="4529854"/>
           </a:xfrm>
           <a:prstGeom prst="rect">
             <a:avLst/>
@@ -6889,7 +6922,7 @@
         <p:spPr>
           <a:xfrm>
             <a:off x="799889" y="598565"/>
-            <a:ext cx="7444938" cy="586589"/>
+            <a:ext cx="7444938" cy="586590"/>
           </a:xfrm>
           <a:prstGeom prst="rect">
             <a:avLst/>
@@ -6916,8 +6949,8 @@
         </p:nvSpPr>
         <p:spPr>
           <a:xfrm>
-            <a:off x="799889" y="1185150"/>
-            <a:ext cx="7444938" cy="4529852"/>
+            <a:off x="799889" y="1185149"/>
+            <a:ext cx="7444938" cy="4529854"/>
           </a:xfrm>
           <a:prstGeom prst="rect">
             <a:avLst/>
@@ -6954,6 +6987,16 @@
           </a:p>
           <a:p>
             <a:pPr/>
+            <a:endParaRPr u="sng">
+              <a:solidFill>
+                <a:srgbClr val="0000FF"/>
+              </a:solidFill>
+              <a:uFill>
+                <a:solidFill>
+                  <a:srgbClr val="0000FF"/>
+                </a:solidFill>
+              </a:uFill>
+            </a:endParaRPr>
           </a:p>
           <a:p>
             <a:pPr/>
@@ -7047,7 +7090,7 @@
         <p:spPr>
           <a:xfrm>
             <a:off x="799889" y="598565"/>
-            <a:ext cx="7444938" cy="586589"/>
+            <a:ext cx="7444938" cy="586590"/>
           </a:xfrm>
           <a:prstGeom prst="rect">
             <a:avLst/>
@@ -7074,8 +7117,8 @@
         </p:nvSpPr>
         <p:spPr>
           <a:xfrm>
-            <a:off x="799889" y="1185150"/>
-            <a:ext cx="7444938" cy="4529852"/>
+            <a:off x="799889" y="1185149"/>
+            <a:ext cx="7444938" cy="4529854"/>
           </a:xfrm>
           <a:prstGeom prst="rect">
             <a:avLst/>
@@ -7240,14 +7283,14 @@
     </a:clrScheme>
     <a:fontScheme name="Default">
       <a:majorFont>
+        <a:latin typeface="Avenir Roman"/>
+        <a:ea typeface="Avenir Roman"/>
+        <a:cs typeface="Avenir Roman"/>
+      </a:majorFont>
+      <a:minorFont>
         <a:latin typeface="Helvetica"/>
         <a:ea typeface="Helvetica"/>
         <a:cs typeface="Helvetica"/>
-      </a:majorFont>
-      <a:minorFont>
-        <a:latin typeface="Avenir Roman"/>
-        <a:ea typeface="Avenir Roman"/>
-        <a:cs typeface="Avenir Roman"/>
       </a:minorFont>
     </a:fontScheme>
     <a:fmtScheme name="Default">
@@ -7455,7 +7498,7 @@
             <a:latin typeface="+mj-lt"/>
             <a:ea typeface="+mj-ea"/>
             <a:cs typeface="+mj-cs"/>
-            <a:sym typeface="Helvetica"/>
+            <a:sym typeface="Avenir Roman"/>
           </a:defRPr>
         </a:defPPr>
         <a:lvl1pPr marL="0" marR="0" indent="0" algn="l" defTabSz="914400" rtl="0" fontAlgn="auto" latinLnBrk="1" hangingPunct="0">
@@ -8032,7 +8075,7 @@
             <a:latin typeface="+mj-lt"/>
             <a:ea typeface="+mj-ea"/>
             <a:cs typeface="+mj-cs"/>
-            <a:sym typeface="Helvetica"/>
+            <a:sym typeface="Avenir Roman"/>
           </a:defRPr>
         </a:defPPr>
         <a:lvl1pPr marL="0" marR="0" indent="0" algn="l" defTabSz="914400" rtl="0" fontAlgn="auto" latinLnBrk="1" hangingPunct="0">
@@ -8324,14 +8367,14 @@
     </a:clrScheme>
     <a:fontScheme name="Default">
       <a:majorFont>
+        <a:latin typeface="Avenir Roman"/>
+        <a:ea typeface="Avenir Roman"/>
+        <a:cs typeface="Avenir Roman"/>
+      </a:majorFont>
+      <a:minorFont>
         <a:latin typeface="Helvetica"/>
         <a:ea typeface="Helvetica"/>
         <a:cs typeface="Helvetica"/>
-      </a:majorFont>
-      <a:minorFont>
-        <a:latin typeface="Avenir Roman"/>
-        <a:ea typeface="Avenir Roman"/>
-        <a:cs typeface="Avenir Roman"/>
       </a:minorFont>
     </a:fontScheme>
     <a:fmtScheme name="Default">
@@ -8539,7 +8582,7 @@
             <a:latin typeface="+mj-lt"/>
             <a:ea typeface="+mj-ea"/>
             <a:cs typeface="+mj-cs"/>
-            <a:sym typeface="Helvetica"/>
+            <a:sym typeface="Avenir Roman"/>
           </a:defRPr>
         </a:defPPr>
         <a:lvl1pPr marL="0" marR="0" indent="0" algn="l" defTabSz="914400" rtl="0" fontAlgn="auto" latinLnBrk="1" hangingPunct="0">
@@ -9116,7 +9159,7 @@
             <a:latin typeface="+mj-lt"/>
             <a:ea typeface="+mj-ea"/>
             <a:cs typeface="+mj-cs"/>
-            <a:sym typeface="Helvetica"/>
+            <a:sym typeface="Avenir Roman"/>
           </a:defRPr>
         </a:defPPr>
         <a:lvl1pPr marL="0" marR="0" indent="0" algn="l" defTabSz="914400" rtl="0" fontAlgn="auto" latinLnBrk="1" hangingPunct="0">

</xml_diff>